<commit_message>
update Final report Mutex
</commit_message>
<xml_diff>
--- a/부트캠프_07기_01반_결과보고서(1팀).pptx
+++ b/부트캠프_07기_01반_결과보고서(1팀).pptx
@@ -3518,6 +3518,41 @@
               <a:buFont typeface="Wingdings" panose="05000000000000000000" pitchFamily="2" charset="2"/>
               <a:buChar char="Ø"/>
             </a:pPr>
+            <a:r>
+              <a:rPr lang="ko-KR" altLang="en-US" sz="2000" smtClean="0">
+                <a:latin typeface="LG스마트체2.0 Regular" panose="020B0600000101010101" pitchFamily="50" charset="-127"/>
+                <a:ea typeface="LG스마트체2.0 Regular" panose="020B0600000101010101" pitchFamily="50" charset="-127"/>
+              </a:rPr>
+              <a:t>구현한 </a:t>
+            </a:r>
+            <a:r>
+              <a:rPr lang="en-US" altLang="ko-KR" sz="2000" smtClean="0">
+                <a:latin typeface="LG스마트체2.0 Regular" panose="020B0600000101010101" pitchFamily="50" charset="-127"/>
+                <a:ea typeface="LG스마트체2.0 Regular" panose="020B0600000101010101" pitchFamily="50" charset="-127"/>
+              </a:rPr>
+              <a:t>RTOS </a:t>
+            </a:r>
+            <a:r>
+              <a:rPr lang="ko-KR" altLang="en-US" sz="2000" smtClean="0">
+                <a:latin typeface="LG스마트체2.0 Regular" panose="020B0600000101010101" pitchFamily="50" charset="-127"/>
+                <a:ea typeface="LG스마트체2.0 Regular" panose="020B0600000101010101" pitchFamily="50" charset="-127"/>
+              </a:rPr>
+              <a:t>기능으로 </a:t>
+            </a:r>
+            <a:r>
+              <a:rPr lang="en-US" altLang="ko-KR" sz="2000" smtClean="0">
+                <a:latin typeface="LG스마트체2.0 Regular" panose="020B0600000101010101" pitchFamily="50" charset="-127"/>
+                <a:ea typeface="LG스마트체2.0 Regular" panose="020B0600000101010101" pitchFamily="50" charset="-127"/>
+              </a:rPr>
+              <a:t>Snake </a:t>
+            </a:r>
+            <a:r>
+              <a:rPr lang="ko-KR" altLang="en-US" sz="2000" smtClean="0">
+                <a:latin typeface="LG스마트체2.0 Regular" panose="020B0600000101010101" pitchFamily="50" charset="-127"/>
+                <a:ea typeface="LG스마트체2.0 Regular" panose="020B0600000101010101" pitchFamily="50" charset="-127"/>
+              </a:rPr>
+              <a:t>게임 제작</a:t>
+            </a:r>
             <a:endParaRPr lang="en-US" altLang="ko-KR" sz="2000">
               <a:latin typeface="LG스마트체2.0 Regular" panose="020B0600000101010101" pitchFamily="50" charset="-127"/>
               <a:ea typeface="LG스마트체2.0 Regular" panose="020B0600000101010101" pitchFamily="50" charset="-127"/>
@@ -3545,7 +3580,7 @@
         </p:nvSpPr>
         <p:spPr>
           <a:xfrm>
-            <a:off x="2171700" y="6267450"/>
+            <a:off x="2171700" y="7113588"/>
             <a:ext cx="10267950" cy="2762250"/>
           </a:xfrm>
           <a:prstGeom prst="rect">
@@ -3918,7 +3953,7 @@
         <p:spPr>
           <a:xfrm>
             <a:off x="737675" y="1800664"/>
-            <a:ext cx="9754593" cy="2985433"/>
+            <a:ext cx="9754593" cy="5755422"/>
           </a:xfrm>
           <a:prstGeom prst="rect">
             <a:avLst/>
@@ -4198,6 +4233,138 @@
               </a:rPr>
               <a:t> </a:t>
             </a:r>
+            <a:r>
+              <a:rPr lang="en-US" altLang="ko-KR" sz="2000" smtClean="0">
+                <a:latin typeface="LG스마트체2.0 Regular" panose="020B0600000101010101" pitchFamily="50" charset="-127"/>
+                <a:ea typeface="LG스마트체2.0 Regular" panose="020B0600000101010101" pitchFamily="50" charset="-127"/>
+              </a:rPr>
+              <a:t>Task </a:t>
+            </a:r>
+            <a:r>
+              <a:rPr lang="ko-KR" altLang="en-US" sz="2000" smtClean="0">
+                <a:latin typeface="LG스마트체2.0 Regular" panose="020B0600000101010101" pitchFamily="50" charset="-127"/>
+                <a:ea typeface="LG스마트체2.0 Regular" panose="020B0600000101010101" pitchFamily="50" charset="-127"/>
+              </a:rPr>
+              <a:t>별로 아래와 같은 기능을 갖는 </a:t>
+            </a:r>
+            <a:r>
+              <a:rPr lang="en-US" altLang="ko-KR" sz="2000" smtClean="0">
+                <a:latin typeface="LG스마트체2.0 Regular" panose="020B0600000101010101" pitchFamily="50" charset="-127"/>
+                <a:ea typeface="LG스마트체2.0 Regular" panose="020B0600000101010101" pitchFamily="50" charset="-127"/>
+              </a:rPr>
+              <a:t>Snake </a:t>
+            </a:r>
+            <a:r>
+              <a:rPr lang="ko-KR" altLang="en-US" sz="2000" smtClean="0">
+                <a:latin typeface="LG스마트체2.0 Regular" panose="020B0600000101010101" pitchFamily="50" charset="-127"/>
+                <a:ea typeface="LG스마트체2.0 Regular" panose="020B0600000101010101" pitchFamily="50" charset="-127"/>
+              </a:rPr>
+              <a:t>게임 구현</a:t>
+            </a:r>
+            <a:endParaRPr lang="en-US" altLang="ko-KR" sz="2000" smtClean="0">
+              <a:latin typeface="LG스마트체2.0 Regular" panose="020B0600000101010101" pitchFamily="50" charset="-127"/>
+              <a:ea typeface="LG스마트체2.0 Regular" panose="020B0600000101010101" pitchFamily="50" charset="-127"/>
+            </a:endParaRPr>
+          </a:p>
+          <a:p>
+            <a:pPr marL="800100" lvl="1" indent="-342900">
+              <a:buFont typeface="Wingdings" panose="05000000000000000000" pitchFamily="2" charset="2"/>
+              <a:buChar char="Ø"/>
+            </a:pPr>
+            <a:endParaRPr lang="en-US" altLang="ko-KR" sz="2000">
+              <a:latin typeface="LG스마트체2.0 Regular" panose="020B0600000101010101" pitchFamily="50" charset="-127"/>
+              <a:ea typeface="LG스마트체2.0 Regular" panose="020B0600000101010101" pitchFamily="50" charset="-127"/>
+            </a:endParaRPr>
+          </a:p>
+          <a:p>
+            <a:pPr marL="800100" lvl="1" indent="-342900">
+              <a:buFont typeface="Wingdings" panose="05000000000000000000" pitchFamily="2" charset="2"/>
+              <a:buChar char="Ø"/>
+            </a:pPr>
+            <a:endParaRPr lang="en-US" altLang="ko-KR" sz="2000" smtClean="0">
+              <a:latin typeface="LG스마트체2.0 Regular" panose="020B0600000101010101" pitchFamily="50" charset="-127"/>
+              <a:ea typeface="LG스마트체2.0 Regular" panose="020B0600000101010101" pitchFamily="50" charset="-127"/>
+            </a:endParaRPr>
+          </a:p>
+          <a:p>
+            <a:pPr marL="800100" lvl="1" indent="-342900">
+              <a:buFont typeface="Wingdings" panose="05000000000000000000" pitchFamily="2" charset="2"/>
+              <a:buChar char="Ø"/>
+            </a:pPr>
+            <a:endParaRPr lang="en-US" altLang="ko-KR" sz="2000">
+              <a:latin typeface="LG스마트체2.0 Regular" panose="020B0600000101010101" pitchFamily="50" charset="-127"/>
+              <a:ea typeface="LG스마트체2.0 Regular" panose="020B0600000101010101" pitchFamily="50" charset="-127"/>
+            </a:endParaRPr>
+          </a:p>
+          <a:p>
+            <a:pPr marL="800100" lvl="1" indent="-342900">
+              <a:buFont typeface="Wingdings" panose="05000000000000000000" pitchFamily="2" charset="2"/>
+              <a:buChar char="Ø"/>
+            </a:pPr>
+            <a:endParaRPr lang="en-US" altLang="ko-KR" sz="2000" smtClean="0">
+              <a:latin typeface="LG스마트체2.0 Regular" panose="020B0600000101010101" pitchFamily="50" charset="-127"/>
+              <a:ea typeface="LG스마트체2.0 Regular" panose="020B0600000101010101" pitchFamily="50" charset="-127"/>
+            </a:endParaRPr>
+          </a:p>
+          <a:p>
+            <a:pPr marL="800100" lvl="1" indent="-342900">
+              <a:buFont typeface="Wingdings" panose="05000000000000000000" pitchFamily="2" charset="2"/>
+              <a:buChar char="Ø"/>
+            </a:pPr>
+            <a:endParaRPr lang="en-US" altLang="ko-KR" sz="2000">
+              <a:latin typeface="LG스마트체2.0 Regular" panose="020B0600000101010101" pitchFamily="50" charset="-127"/>
+              <a:ea typeface="LG스마트체2.0 Regular" panose="020B0600000101010101" pitchFamily="50" charset="-127"/>
+            </a:endParaRPr>
+          </a:p>
+          <a:p>
+            <a:pPr marL="800100" lvl="1" indent="-342900">
+              <a:buFont typeface="Wingdings" panose="05000000000000000000" pitchFamily="2" charset="2"/>
+              <a:buChar char="Ø"/>
+            </a:pPr>
+            <a:endParaRPr lang="en-US" altLang="ko-KR" sz="2000" smtClean="0">
+              <a:latin typeface="LG스마트체2.0 Regular" panose="020B0600000101010101" pitchFamily="50" charset="-127"/>
+              <a:ea typeface="LG스마트체2.0 Regular" panose="020B0600000101010101" pitchFamily="50" charset="-127"/>
+            </a:endParaRPr>
+          </a:p>
+          <a:p>
+            <a:pPr marL="800100" lvl="1" indent="-342900">
+              <a:buFont typeface="Wingdings" panose="05000000000000000000" pitchFamily="2" charset="2"/>
+              <a:buChar char="Ø"/>
+            </a:pPr>
+            <a:endParaRPr lang="en-US" altLang="ko-KR" sz="2000">
+              <a:latin typeface="LG스마트체2.0 Regular" panose="020B0600000101010101" pitchFamily="50" charset="-127"/>
+              <a:ea typeface="LG스마트체2.0 Regular" panose="020B0600000101010101" pitchFamily="50" charset="-127"/>
+            </a:endParaRPr>
+          </a:p>
+          <a:p>
+            <a:pPr marL="800100" lvl="1" indent="-342900">
+              <a:buFont typeface="Wingdings" panose="05000000000000000000" pitchFamily="2" charset="2"/>
+              <a:buChar char="Ø"/>
+            </a:pPr>
+            <a:endParaRPr lang="en-US" altLang="ko-KR" sz="2000" smtClean="0">
+              <a:latin typeface="LG스마트체2.0 Regular" panose="020B0600000101010101" pitchFamily="50" charset="-127"/>
+              <a:ea typeface="LG스마트체2.0 Regular" panose="020B0600000101010101" pitchFamily="50" charset="-127"/>
+            </a:endParaRPr>
+          </a:p>
+          <a:p>
+            <a:pPr marL="800100" lvl="1" indent="-342900">
+              <a:buFont typeface="Wingdings" panose="05000000000000000000" pitchFamily="2" charset="2"/>
+              <a:buChar char="Ø"/>
+            </a:pPr>
+            <a:r>
+              <a:rPr lang="ko-KR" altLang="en-US" sz="2000" smtClean="0">
+                <a:latin typeface="LG스마트체2.0 Regular" panose="020B0600000101010101" pitchFamily="50" charset="-127"/>
+                <a:ea typeface="LG스마트체2.0 Regular" panose="020B0600000101010101" pitchFamily="50" charset="-127"/>
+              </a:rPr>
+              <a:t>제작 게임 </a:t>
+            </a:r>
+            <a:r>
+              <a:rPr lang="en-US" altLang="ko-KR" sz="2000" smtClean="0">
+                <a:latin typeface="LG스마트체2.0 Regular" panose="020B0600000101010101" pitchFamily="50" charset="-127"/>
+                <a:ea typeface="LG스마트체2.0 Regular" panose="020B0600000101010101" pitchFamily="50" charset="-127"/>
+              </a:rPr>
+              <a:t>demo</a:t>
+            </a:r>
             <a:endParaRPr lang="en-US" altLang="ko-KR" sz="2000">
               <a:latin typeface="LG스마트체2.0 Regular" panose="020B0600000101010101" pitchFamily="50" charset="-127"/>
               <a:ea typeface="LG스마트체2.0 Regular" panose="020B0600000101010101" pitchFamily="50" charset="-127"/>
@@ -4217,85 +4384,650 @@
           </a:p>
         </p:txBody>
       </p:sp>
-      <p:sp>
-        <p:nvSpPr>
-          <p:cNvPr id="5" name="직사각형 4"/>
-          <p:cNvSpPr/>
+      <p:grpSp>
+        <p:nvGrpSpPr>
+          <p:cNvPr id="6" name="그룹 5"/>
+          <p:cNvGrpSpPr/>
           <p:nvPr/>
-        </p:nvSpPr>
-        <p:spPr>
+        </p:nvGrpSpPr>
+        <p:grpSpPr>
           <a:xfrm>
-            <a:off x="2171700" y="4330254"/>
-            <a:ext cx="10267950" cy="2762250"/>
+            <a:off x="2617970" y="4292176"/>
+            <a:ext cx="6271180" cy="1854811"/>
+            <a:chOff x="223455" y="2615967"/>
+            <a:chExt cx="6271180" cy="1854811"/>
           </a:xfrm>
-          <a:prstGeom prst="rect">
-            <a:avLst/>
-          </a:prstGeom>
-        </p:spPr>
-        <p:style>
-          <a:lnRef idx="2">
-            <a:schemeClr val="accent1">
-              <a:shade val="50000"/>
-            </a:schemeClr>
-          </a:lnRef>
-          <a:fillRef idx="1">
-            <a:schemeClr val="accent1"/>
-          </a:fillRef>
-          <a:effectRef idx="0">
-            <a:schemeClr val="accent1"/>
-          </a:effectRef>
-          <a:fontRef idx="minor">
-            <a:schemeClr val="lt1"/>
-          </a:fontRef>
-        </p:style>
-        <p:txBody>
-          <a:bodyPr rtlCol="0" anchor="ctr"/>
-          <a:lstStyle/>
-          <a:p>
-            <a:pPr algn="ctr"/>
-            <a:r>
-              <a:rPr lang="en-US" altLang="ko-KR" smtClean="0"/>
-              <a:t>TBD</a:t>
-            </a:r>
-          </a:p>
-          <a:p>
-            <a:pPr algn="ctr"/>
-            <a:r>
-              <a:rPr lang="ko-KR" altLang="en-US" smtClean="0"/>
-              <a:t>구현한 </a:t>
-            </a:r>
-            <a:r>
-              <a:rPr lang="en-US" altLang="ko-KR" smtClean="0"/>
-              <a:t>RTOS </a:t>
-            </a:r>
-            <a:r>
-              <a:rPr lang="ko-KR" altLang="en-US" smtClean="0"/>
-              <a:t>기능을 기반으로 </a:t>
-            </a:r>
-            <a:r>
-              <a:rPr lang="en-US" altLang="ko-KR" smtClean="0"/>
-              <a:t>demo application(snake) </a:t>
-            </a:r>
-            <a:r>
-              <a:rPr lang="ko-KR" altLang="en-US" smtClean="0"/>
-              <a:t>구현 완료</a:t>
-            </a:r>
-            <a:r>
-              <a:rPr lang="en-US" altLang="ko-KR" smtClean="0"/>
-              <a:t>(</a:t>
-            </a:r>
-            <a:r>
-              <a:rPr lang="ko-KR" altLang="en-US" smtClean="0"/>
-              <a:t>구체적으로</a:t>
-            </a:r>
-            <a:r>
-              <a:rPr lang="en-US" altLang="ko-KR" smtClean="0"/>
-              <a:t>)</a:t>
-            </a:r>
-            <a:endParaRPr lang="ko-KR" altLang="en-US"/>
-          </a:p>
-        </p:txBody>
-      </p:sp>
+        </p:grpSpPr>
+        <p:sp>
+          <p:nvSpPr>
+            <p:cNvPr id="7" name="모서리가 둥근 직사각형 6"/>
+            <p:cNvSpPr/>
+            <p:nvPr/>
+          </p:nvSpPr>
+          <p:spPr>
+            <a:xfrm>
+              <a:off x="4436739" y="2923743"/>
+              <a:ext cx="2057896" cy="1547035"/>
+            </a:xfrm>
+            <a:prstGeom prst="roundRect">
+              <a:avLst>
+                <a:gd name="adj" fmla="val 19940"/>
+              </a:avLst>
+            </a:prstGeom>
+            <a:solidFill>
+              <a:schemeClr val="bg1"/>
+            </a:solidFill>
+            <a:ln>
+              <a:solidFill>
+                <a:schemeClr val="tx1">
+                  <a:lumMod val="50000"/>
+                  <a:lumOff val="50000"/>
+                </a:schemeClr>
+              </a:solidFill>
+            </a:ln>
+          </p:spPr>
+          <p:style>
+            <a:lnRef idx="2">
+              <a:schemeClr val="accent1">
+                <a:shade val="50000"/>
+              </a:schemeClr>
+            </a:lnRef>
+            <a:fillRef idx="1">
+              <a:schemeClr val="accent1"/>
+            </a:fillRef>
+            <a:effectRef idx="0">
+              <a:schemeClr val="accent1"/>
+            </a:effectRef>
+            <a:fontRef idx="minor">
+              <a:schemeClr val="lt1"/>
+            </a:fontRef>
+          </p:style>
+          <p:txBody>
+            <a:bodyPr rtlCol="0" anchor="t"/>
+            <a:lstStyle/>
+            <a:p>
+              <a:pPr algn="ctr"/>
+              <a:r>
+                <a:rPr lang="en-US" altLang="ko-KR" sz="1400" b="1" smtClean="0">
+                  <a:solidFill>
+                    <a:schemeClr val="tx1"/>
+                  </a:solidFill>
+                  <a:latin typeface="LG스마트체 Bold" panose="020B0600000101010101" pitchFamily="50" charset="-127"/>
+                  <a:ea typeface="LG스마트체 Bold" panose="020B0600000101010101" pitchFamily="50" charset="-127"/>
+                </a:rPr>
+                <a:t>Update Display</a:t>
+              </a:r>
+            </a:p>
+            <a:p>
+              <a:pPr marL="285750" indent="-285750">
+                <a:buFont typeface="Wingdings" panose="05000000000000000000" pitchFamily="2" charset="2"/>
+                <a:buChar char="ü"/>
+              </a:pPr>
+              <a:r>
+                <a:rPr lang="en-US" altLang="ko-KR" sz="1400" b="1" smtClean="0">
+                  <a:solidFill>
+                    <a:schemeClr val="tx1"/>
+                  </a:solidFill>
+                  <a:latin typeface="LG스마트체 Bold" panose="020B0600000101010101" pitchFamily="50" charset="-127"/>
+                  <a:ea typeface="LG스마트체 Bold" panose="020B0600000101010101" pitchFamily="50" charset="-127"/>
+                </a:rPr>
+                <a:t>Snake</a:t>
+              </a:r>
+            </a:p>
+            <a:p>
+              <a:pPr marL="285750" indent="-285750">
+                <a:buFont typeface="Wingdings" panose="05000000000000000000" pitchFamily="2" charset="2"/>
+                <a:buChar char="ü"/>
+              </a:pPr>
+              <a:r>
+                <a:rPr lang="en-US" altLang="ko-KR" sz="1400" b="1" smtClean="0">
+                  <a:solidFill>
+                    <a:schemeClr val="tx1"/>
+                  </a:solidFill>
+                  <a:latin typeface="LG스마트체 Bold" panose="020B0600000101010101" pitchFamily="50" charset="-127"/>
+                  <a:ea typeface="LG스마트체 Bold" panose="020B0600000101010101" pitchFamily="50" charset="-127"/>
+                </a:rPr>
+                <a:t>Apple</a:t>
+              </a:r>
+            </a:p>
+            <a:p>
+              <a:pPr marL="285750" indent="-285750">
+                <a:buFont typeface="Wingdings" panose="05000000000000000000" pitchFamily="2" charset="2"/>
+                <a:buChar char="ü"/>
+              </a:pPr>
+              <a:r>
+                <a:rPr lang="en-US" altLang="ko-KR" sz="1400" b="1" smtClean="0">
+                  <a:solidFill>
+                    <a:schemeClr val="tx1"/>
+                  </a:solidFill>
+                  <a:latin typeface="LG스마트체 Bold" panose="020B0600000101010101" pitchFamily="50" charset="-127"/>
+                  <a:ea typeface="LG스마트체 Bold" panose="020B0600000101010101" pitchFamily="50" charset="-127"/>
+                </a:rPr>
+                <a:t>Score</a:t>
+              </a:r>
+            </a:p>
+            <a:p>
+              <a:pPr marL="285750" indent="-285750">
+                <a:buFont typeface="Wingdings" panose="05000000000000000000" pitchFamily="2" charset="2"/>
+                <a:buChar char="ü"/>
+              </a:pPr>
+              <a:r>
+                <a:rPr lang="en-US" altLang="ko-KR" sz="1400" b="1" smtClean="0">
+                  <a:solidFill>
+                    <a:schemeClr val="tx1"/>
+                  </a:solidFill>
+                  <a:latin typeface="LG스마트체 Bold" panose="020B0600000101010101" pitchFamily="50" charset="-127"/>
+                  <a:ea typeface="LG스마트체 Bold" panose="020B0600000101010101" pitchFamily="50" charset="-127"/>
+                </a:rPr>
+                <a:t>Background</a:t>
+              </a:r>
+              <a:endParaRPr lang="ko-KR" altLang="en-US" sz="1400" b="1">
+                <a:solidFill>
+                  <a:schemeClr val="tx1"/>
+                </a:solidFill>
+                <a:latin typeface="LG스마트체 Bold" panose="020B0600000101010101" pitchFamily="50" charset="-127"/>
+                <a:ea typeface="LG스마트체 Bold" panose="020B0600000101010101" pitchFamily="50" charset="-127"/>
+              </a:endParaRPr>
+            </a:p>
+          </p:txBody>
+        </p:sp>
+        <p:sp>
+          <p:nvSpPr>
+            <p:cNvPr id="8" name="TextBox 7"/>
+            <p:cNvSpPr txBox="1"/>
+            <p:nvPr/>
+          </p:nvSpPr>
+          <p:spPr>
+            <a:xfrm>
+              <a:off x="5102446" y="2615967"/>
+              <a:ext cx="726482" cy="307777"/>
+            </a:xfrm>
+            <a:prstGeom prst="rect">
+              <a:avLst/>
+            </a:prstGeom>
+            <a:noFill/>
+          </p:spPr>
+          <p:txBody>
+            <a:bodyPr wrap="none" rtlCol="0">
+              <a:spAutoFit/>
+            </a:bodyPr>
+            <a:lstStyle/>
+            <a:p>
+              <a:pPr algn="ctr"/>
+              <a:r>
+                <a:rPr lang="en-US" altLang="ko-KR" sz="1400" smtClean="0">
+                  <a:latin typeface="LG스마트체 Bold" panose="020B0600000101010101" pitchFamily="50" charset="-127"/>
+                  <a:ea typeface="LG스마트체 Bold" panose="020B0600000101010101" pitchFamily="50" charset="-127"/>
+                </a:rPr>
+                <a:t>Task 3</a:t>
+              </a:r>
+              <a:endParaRPr lang="ko-KR" altLang="en-US" sz="1400">
+                <a:latin typeface="LG스마트체 Bold" panose="020B0600000101010101" pitchFamily="50" charset="-127"/>
+                <a:ea typeface="LG스마트체 Bold" panose="020B0600000101010101" pitchFamily="50" charset="-127"/>
+              </a:endParaRPr>
+            </a:p>
+          </p:txBody>
+        </p:sp>
+        <p:sp>
+          <p:nvSpPr>
+            <p:cNvPr id="9" name="모서리가 둥근 직사각형 8"/>
+            <p:cNvSpPr/>
+            <p:nvPr/>
+          </p:nvSpPr>
+          <p:spPr>
+            <a:xfrm>
+              <a:off x="223455" y="2923743"/>
+              <a:ext cx="2057896" cy="1547035"/>
+            </a:xfrm>
+            <a:prstGeom prst="roundRect">
+              <a:avLst>
+                <a:gd name="adj" fmla="val 19940"/>
+              </a:avLst>
+            </a:prstGeom>
+            <a:solidFill>
+              <a:schemeClr val="bg1"/>
+            </a:solidFill>
+            <a:ln>
+              <a:solidFill>
+                <a:schemeClr val="tx1">
+                  <a:lumMod val="50000"/>
+                  <a:lumOff val="50000"/>
+                </a:schemeClr>
+              </a:solidFill>
+            </a:ln>
+          </p:spPr>
+          <p:style>
+            <a:lnRef idx="2">
+              <a:schemeClr val="accent1">
+                <a:shade val="50000"/>
+              </a:schemeClr>
+            </a:lnRef>
+            <a:fillRef idx="1">
+              <a:schemeClr val="accent1"/>
+            </a:fillRef>
+            <a:effectRef idx="0">
+              <a:schemeClr val="accent1"/>
+            </a:effectRef>
+            <a:fontRef idx="minor">
+              <a:schemeClr val="lt1"/>
+            </a:fontRef>
+          </p:style>
+          <p:txBody>
+            <a:bodyPr rtlCol="0" anchor="t"/>
+            <a:lstStyle/>
+            <a:p>
+              <a:pPr algn="ctr"/>
+              <a:r>
+                <a:rPr lang="en-US" altLang="ko-KR" sz="1400" b="1" smtClean="0">
+                  <a:solidFill>
+                    <a:schemeClr val="tx1"/>
+                  </a:solidFill>
+                  <a:latin typeface="LG스마트체 Bold" panose="020B0600000101010101" pitchFamily="50" charset="-127"/>
+                  <a:ea typeface="LG스마트체 Bold" panose="020B0600000101010101" pitchFamily="50" charset="-127"/>
+                </a:rPr>
+                <a:t>Overall status</a:t>
+              </a:r>
+              <a:r>
+                <a:rPr lang="ko-KR" altLang="en-US" sz="1400" b="1">
+                  <a:solidFill>
+                    <a:schemeClr val="tx1"/>
+                  </a:solidFill>
+                  <a:latin typeface="LG스마트체 Bold" panose="020B0600000101010101" pitchFamily="50" charset="-127"/>
+                  <a:ea typeface="LG스마트체 Bold" panose="020B0600000101010101" pitchFamily="50" charset="-127"/>
+                </a:rPr>
+                <a:t> </a:t>
+              </a:r>
+              <a:r>
+                <a:rPr lang="ko-KR" altLang="en-US" sz="1400" b="1" smtClean="0">
+                  <a:solidFill>
+                    <a:schemeClr val="tx1"/>
+                  </a:solidFill>
+                  <a:latin typeface="LG스마트체 Bold" panose="020B0600000101010101" pitchFamily="50" charset="-127"/>
+                  <a:ea typeface="LG스마트체 Bold" panose="020B0600000101010101" pitchFamily="50" charset="-127"/>
+                </a:rPr>
+                <a:t>관리</a:t>
+              </a:r>
+              <a:endParaRPr lang="en-US" altLang="ko-KR" sz="1400" b="1" smtClean="0">
+                <a:solidFill>
+                  <a:schemeClr val="tx1"/>
+                </a:solidFill>
+                <a:latin typeface="LG스마트체 Bold" panose="020B0600000101010101" pitchFamily="50" charset="-127"/>
+                <a:ea typeface="LG스마트체 Bold" panose="020B0600000101010101" pitchFamily="50" charset="-127"/>
+              </a:endParaRPr>
+            </a:p>
+            <a:p>
+              <a:pPr marL="285750" indent="-285750">
+                <a:buFont typeface="Wingdings" panose="05000000000000000000" pitchFamily="2" charset="2"/>
+                <a:buChar char="ü"/>
+              </a:pPr>
+              <a:r>
+                <a:rPr lang="en-US" altLang="ko-KR" sz="1400" smtClean="0">
+                  <a:solidFill>
+                    <a:schemeClr val="tx1"/>
+                  </a:solidFill>
+                  <a:latin typeface="LG스마트체 Bold" panose="020B0600000101010101" pitchFamily="50" charset="-127"/>
+                  <a:ea typeface="LG스마트체 Bold" panose="020B0600000101010101" pitchFamily="50" charset="-127"/>
+                </a:rPr>
+                <a:t>Snake Key </a:t>
+              </a:r>
+              <a:r>
+                <a:rPr lang="ko-KR" altLang="en-US" sz="1400" smtClean="0">
+                  <a:solidFill>
+                    <a:schemeClr val="tx1"/>
+                  </a:solidFill>
+                  <a:latin typeface="LG스마트체 Bold" panose="020B0600000101010101" pitchFamily="50" charset="-127"/>
+                  <a:ea typeface="LG스마트체 Bold" panose="020B0600000101010101" pitchFamily="50" charset="-127"/>
+                </a:rPr>
+                <a:t>입력</a:t>
+              </a:r>
+              <a:endParaRPr lang="en-US" altLang="ko-KR" sz="1400" smtClean="0">
+                <a:solidFill>
+                  <a:schemeClr val="tx1"/>
+                </a:solidFill>
+                <a:latin typeface="LG스마트체 Bold" panose="020B0600000101010101" pitchFamily="50" charset="-127"/>
+                <a:ea typeface="LG스마트체 Bold" panose="020B0600000101010101" pitchFamily="50" charset="-127"/>
+              </a:endParaRPr>
+            </a:p>
+            <a:p>
+              <a:pPr marL="285750" indent="-285750">
+                <a:buFont typeface="Wingdings" panose="05000000000000000000" pitchFamily="2" charset="2"/>
+                <a:buChar char="ü"/>
+              </a:pPr>
+              <a:r>
+                <a:rPr lang="en-US" altLang="ko-KR" sz="1400" smtClean="0">
+                  <a:solidFill>
+                    <a:schemeClr val="tx1"/>
+                  </a:solidFill>
+                  <a:latin typeface="LG스마트체 Bold" panose="020B0600000101010101" pitchFamily="50" charset="-127"/>
+                  <a:ea typeface="LG스마트체 Bold" panose="020B0600000101010101" pitchFamily="50" charset="-127"/>
+                </a:rPr>
+                <a:t>Snake </a:t>
+              </a:r>
+              <a:r>
+                <a:rPr lang="ko-KR" altLang="en-US" sz="1400" smtClean="0">
+                  <a:solidFill>
+                    <a:schemeClr val="tx1"/>
+                  </a:solidFill>
+                  <a:latin typeface="LG스마트체 Bold" panose="020B0600000101010101" pitchFamily="50" charset="-127"/>
+                  <a:ea typeface="LG스마트체 Bold" panose="020B0600000101010101" pitchFamily="50" charset="-127"/>
+                </a:rPr>
+                <a:t>위치 계산</a:t>
+              </a:r>
+              <a:endParaRPr lang="en-US" altLang="ko-KR" sz="1400" smtClean="0">
+                <a:solidFill>
+                  <a:schemeClr val="tx1"/>
+                </a:solidFill>
+                <a:latin typeface="LG스마트체 Bold" panose="020B0600000101010101" pitchFamily="50" charset="-127"/>
+                <a:ea typeface="LG스마트체 Bold" panose="020B0600000101010101" pitchFamily="50" charset="-127"/>
+              </a:endParaRPr>
+            </a:p>
+            <a:p>
+              <a:pPr marL="285750" indent="-285750">
+                <a:buFont typeface="Wingdings" panose="05000000000000000000" pitchFamily="2" charset="2"/>
+                <a:buChar char="ü"/>
+              </a:pPr>
+              <a:r>
+                <a:rPr lang="en-US" altLang="ko-KR" sz="1400" smtClean="0">
+                  <a:solidFill>
+                    <a:schemeClr val="tx1"/>
+                  </a:solidFill>
+                  <a:latin typeface="LG스마트체 Bold" panose="020B0600000101010101" pitchFamily="50" charset="-127"/>
+                  <a:ea typeface="LG스마트체 Bold" panose="020B0600000101010101" pitchFamily="50" charset="-127"/>
+                </a:rPr>
+                <a:t>Apple </a:t>
+              </a:r>
+              <a:r>
+                <a:rPr lang="ko-KR" altLang="en-US" sz="1400" smtClean="0">
+                  <a:solidFill>
+                    <a:schemeClr val="tx1"/>
+                  </a:solidFill>
+                  <a:latin typeface="LG스마트체 Bold" panose="020B0600000101010101" pitchFamily="50" charset="-127"/>
+                  <a:ea typeface="LG스마트체 Bold" panose="020B0600000101010101" pitchFamily="50" charset="-127"/>
+                </a:rPr>
+                <a:t>위치 계산</a:t>
+              </a:r>
+              <a:endParaRPr lang="en-US" altLang="ko-KR" sz="1400" smtClean="0">
+                <a:solidFill>
+                  <a:schemeClr val="tx1"/>
+                </a:solidFill>
+                <a:latin typeface="LG스마트체 Bold" panose="020B0600000101010101" pitchFamily="50" charset="-127"/>
+                <a:ea typeface="LG스마트체 Bold" panose="020B0600000101010101" pitchFamily="50" charset="-127"/>
+              </a:endParaRPr>
+            </a:p>
+            <a:p>
+              <a:pPr marL="285750" indent="-285750">
+                <a:buFont typeface="Wingdings" panose="05000000000000000000" pitchFamily="2" charset="2"/>
+                <a:buChar char="ü"/>
+              </a:pPr>
+              <a:r>
+                <a:rPr lang="en-US" altLang="ko-KR" sz="1400" smtClean="0">
+                  <a:solidFill>
+                    <a:schemeClr val="tx1"/>
+                  </a:solidFill>
+                  <a:latin typeface="LG스마트체 Bold" panose="020B0600000101010101" pitchFamily="50" charset="-127"/>
+                  <a:ea typeface="LG스마트체 Bold" panose="020B0600000101010101" pitchFamily="50" charset="-127"/>
+                </a:rPr>
+                <a:t>Score update</a:t>
+              </a:r>
+            </a:p>
+            <a:p>
+              <a:pPr marL="285750" indent="-285750">
+                <a:buFont typeface="Wingdings" panose="05000000000000000000" pitchFamily="2" charset="2"/>
+                <a:buChar char="ü"/>
+              </a:pPr>
+              <a:r>
+                <a:rPr lang="ko-KR" altLang="en-US" sz="1400" smtClean="0">
+                  <a:solidFill>
+                    <a:schemeClr val="tx1"/>
+                  </a:solidFill>
+                  <a:latin typeface="LG스마트체 Bold" panose="020B0600000101010101" pitchFamily="50" charset="-127"/>
+                  <a:ea typeface="LG스마트체 Bold" panose="020B0600000101010101" pitchFamily="50" charset="-127"/>
+                </a:rPr>
+                <a:t>게임 </a:t>
+              </a:r>
+              <a:r>
+                <a:rPr lang="en-US" altLang="ko-KR" sz="1400" smtClean="0">
+                  <a:solidFill>
+                    <a:schemeClr val="tx1"/>
+                  </a:solidFill>
+                  <a:latin typeface="LG스마트체 Bold" panose="020B0600000101010101" pitchFamily="50" charset="-127"/>
+                  <a:ea typeface="LG스마트체 Bold" panose="020B0600000101010101" pitchFamily="50" charset="-127"/>
+                </a:rPr>
+                <a:t>over </a:t>
+              </a:r>
+              <a:r>
+                <a:rPr lang="ko-KR" altLang="en-US" sz="1400" smtClean="0">
+                  <a:solidFill>
+                    <a:schemeClr val="tx1"/>
+                  </a:solidFill>
+                  <a:latin typeface="LG스마트체 Bold" panose="020B0600000101010101" pitchFamily="50" charset="-127"/>
+                  <a:ea typeface="LG스마트체 Bold" panose="020B0600000101010101" pitchFamily="50" charset="-127"/>
+                </a:rPr>
+                <a:t>조건</a:t>
+              </a:r>
+              <a:endParaRPr lang="ko-KR" altLang="en-US" sz="1400">
+                <a:solidFill>
+                  <a:schemeClr val="tx1"/>
+                </a:solidFill>
+                <a:latin typeface="LG스마트체 Bold" panose="020B0600000101010101" pitchFamily="50" charset="-127"/>
+                <a:ea typeface="LG스마트체 Bold" panose="020B0600000101010101" pitchFamily="50" charset="-127"/>
+              </a:endParaRPr>
+            </a:p>
+          </p:txBody>
+        </p:sp>
+        <p:sp>
+          <p:nvSpPr>
+            <p:cNvPr id="10" name="TextBox 9"/>
+            <p:cNvSpPr txBox="1"/>
+            <p:nvPr/>
+          </p:nvSpPr>
+          <p:spPr>
+            <a:xfrm>
+              <a:off x="889162" y="2615967"/>
+              <a:ext cx="726482" cy="307777"/>
+            </a:xfrm>
+            <a:prstGeom prst="rect">
+              <a:avLst/>
+            </a:prstGeom>
+            <a:noFill/>
+          </p:spPr>
+          <p:txBody>
+            <a:bodyPr wrap="none" rtlCol="0">
+              <a:spAutoFit/>
+            </a:bodyPr>
+            <a:lstStyle/>
+            <a:p>
+              <a:pPr algn="ctr"/>
+              <a:r>
+                <a:rPr lang="en-US" altLang="ko-KR" sz="1400" smtClean="0">
+                  <a:latin typeface="LG스마트체 Bold" panose="020B0600000101010101" pitchFamily="50" charset="-127"/>
+                  <a:ea typeface="LG스마트체 Bold" panose="020B0600000101010101" pitchFamily="50" charset="-127"/>
+                </a:rPr>
+                <a:t>Task 1</a:t>
+              </a:r>
+              <a:endParaRPr lang="ko-KR" altLang="en-US" sz="1400">
+                <a:latin typeface="LG스마트체 Bold" panose="020B0600000101010101" pitchFamily="50" charset="-127"/>
+                <a:ea typeface="LG스마트체 Bold" panose="020B0600000101010101" pitchFamily="50" charset="-127"/>
+              </a:endParaRPr>
+            </a:p>
+          </p:txBody>
+        </p:sp>
+        <p:sp>
+          <p:nvSpPr>
+            <p:cNvPr id="11" name="모서리가 둥근 직사각형 10"/>
+            <p:cNvSpPr/>
+            <p:nvPr/>
+          </p:nvSpPr>
+          <p:spPr>
+            <a:xfrm>
+              <a:off x="2330097" y="2923743"/>
+              <a:ext cx="2057896" cy="1547035"/>
+            </a:xfrm>
+            <a:prstGeom prst="roundRect">
+              <a:avLst>
+                <a:gd name="adj" fmla="val 19940"/>
+              </a:avLst>
+            </a:prstGeom>
+            <a:solidFill>
+              <a:schemeClr val="bg1"/>
+            </a:solidFill>
+            <a:ln>
+              <a:solidFill>
+                <a:schemeClr val="tx1">
+                  <a:lumMod val="50000"/>
+                  <a:lumOff val="50000"/>
+                </a:schemeClr>
+              </a:solidFill>
+            </a:ln>
+          </p:spPr>
+          <p:style>
+            <a:lnRef idx="2">
+              <a:schemeClr val="accent1">
+                <a:shade val="50000"/>
+              </a:schemeClr>
+            </a:lnRef>
+            <a:fillRef idx="1">
+              <a:schemeClr val="accent1"/>
+            </a:fillRef>
+            <a:effectRef idx="0">
+              <a:schemeClr val="accent1"/>
+            </a:effectRef>
+            <a:fontRef idx="minor">
+              <a:schemeClr val="lt1"/>
+            </a:fontRef>
+          </p:style>
+          <p:txBody>
+            <a:bodyPr rtlCol="0" anchor="t"/>
+            <a:lstStyle/>
+            <a:p>
+              <a:pPr algn="ctr"/>
+              <a:r>
+                <a:rPr lang="en-US" altLang="ko-KR" sz="1400" b="1" smtClean="0">
+                  <a:solidFill>
+                    <a:schemeClr val="tx1"/>
+                  </a:solidFill>
+                  <a:latin typeface="LG스마트체 Bold" panose="020B0600000101010101" pitchFamily="50" charset="-127"/>
+                  <a:ea typeface="LG스마트체 Bold" panose="020B0600000101010101" pitchFamily="50" charset="-127"/>
+                </a:rPr>
+                <a:t>Game mode </a:t>
+              </a:r>
+              <a:r>
+                <a:rPr lang="ko-KR" altLang="en-US" sz="1400" b="1" smtClean="0">
+                  <a:solidFill>
+                    <a:schemeClr val="tx1"/>
+                  </a:solidFill>
+                  <a:latin typeface="LG스마트체 Bold" panose="020B0600000101010101" pitchFamily="50" charset="-127"/>
+                  <a:ea typeface="LG스마트체 Bold" panose="020B0600000101010101" pitchFamily="50" charset="-127"/>
+                </a:rPr>
+                <a:t>설정</a:t>
+              </a:r>
+              <a:endParaRPr lang="en-US" altLang="ko-KR" sz="1400" b="1" smtClean="0">
+                <a:solidFill>
+                  <a:schemeClr val="tx1"/>
+                </a:solidFill>
+                <a:latin typeface="LG스마트체 Bold" panose="020B0600000101010101" pitchFamily="50" charset="-127"/>
+                <a:ea typeface="LG스마트체 Bold" panose="020B0600000101010101" pitchFamily="50" charset="-127"/>
+              </a:endParaRPr>
+            </a:p>
+            <a:p>
+              <a:pPr marL="285750" indent="-285750">
+                <a:buFont typeface="Wingdings" panose="05000000000000000000" pitchFamily="2" charset="2"/>
+                <a:buChar char="ü"/>
+              </a:pPr>
+              <a:r>
+                <a:rPr lang="ko-KR" altLang="en-US" sz="1400" b="1" smtClean="0">
+                  <a:solidFill>
+                    <a:schemeClr val="tx1"/>
+                  </a:solidFill>
+                  <a:latin typeface="LG스마트체 Bold" panose="020B0600000101010101" pitchFamily="50" charset="-127"/>
+                  <a:ea typeface="LG스마트체 Bold" panose="020B0600000101010101" pitchFamily="50" charset="-127"/>
+                </a:rPr>
+                <a:t>게임 </a:t>
+              </a:r>
+              <a:r>
+                <a:rPr lang="en-US" altLang="ko-KR" sz="1400" b="1" smtClean="0">
+                  <a:solidFill>
+                    <a:schemeClr val="tx1"/>
+                  </a:solidFill>
+                  <a:latin typeface="LG스마트체 Bold" panose="020B0600000101010101" pitchFamily="50" charset="-127"/>
+                  <a:ea typeface="LG스마트체 Bold" panose="020B0600000101010101" pitchFamily="50" charset="-127"/>
+                </a:rPr>
+                <a:t>start</a:t>
+              </a:r>
+            </a:p>
+            <a:p>
+              <a:pPr marL="285750" indent="-285750">
+                <a:buFont typeface="Wingdings" panose="05000000000000000000" pitchFamily="2" charset="2"/>
+                <a:buChar char="ü"/>
+              </a:pPr>
+              <a:r>
+                <a:rPr lang="ko-KR" altLang="en-US" sz="1400" b="1" smtClean="0">
+                  <a:solidFill>
+                    <a:schemeClr val="tx1"/>
+                  </a:solidFill>
+                  <a:latin typeface="LG스마트체 Bold" panose="020B0600000101010101" pitchFamily="50" charset="-127"/>
+                  <a:ea typeface="LG스마트체 Bold" panose="020B0600000101010101" pitchFamily="50" charset="-127"/>
+                </a:rPr>
+                <a:t>게임 </a:t>
+              </a:r>
+              <a:r>
+                <a:rPr lang="en-US" altLang="ko-KR" sz="1400" b="1" smtClean="0">
+                  <a:solidFill>
+                    <a:schemeClr val="tx1"/>
+                  </a:solidFill>
+                  <a:latin typeface="LG스마트체 Bold" panose="020B0600000101010101" pitchFamily="50" charset="-127"/>
+                  <a:ea typeface="LG스마트체 Bold" panose="020B0600000101010101" pitchFamily="50" charset="-127"/>
+                </a:rPr>
+                <a:t>over </a:t>
+              </a:r>
+              <a:endParaRPr lang="ko-KR" altLang="en-US" sz="1400" b="1">
+                <a:solidFill>
+                  <a:schemeClr val="tx1"/>
+                </a:solidFill>
+                <a:latin typeface="LG스마트체 Bold" panose="020B0600000101010101" pitchFamily="50" charset="-127"/>
+                <a:ea typeface="LG스마트체 Bold" panose="020B0600000101010101" pitchFamily="50" charset="-127"/>
+              </a:endParaRPr>
+            </a:p>
+          </p:txBody>
+        </p:sp>
+        <p:sp>
+          <p:nvSpPr>
+            <p:cNvPr id="12" name="TextBox 11"/>
+            <p:cNvSpPr txBox="1"/>
+            <p:nvPr/>
+          </p:nvSpPr>
+          <p:spPr>
+            <a:xfrm>
+              <a:off x="2995804" y="2615967"/>
+              <a:ext cx="726482" cy="307777"/>
+            </a:xfrm>
+            <a:prstGeom prst="rect">
+              <a:avLst/>
+            </a:prstGeom>
+            <a:noFill/>
+          </p:spPr>
+          <p:txBody>
+            <a:bodyPr wrap="none" rtlCol="0">
+              <a:spAutoFit/>
+            </a:bodyPr>
+            <a:lstStyle/>
+            <a:p>
+              <a:pPr algn="ctr"/>
+              <a:r>
+                <a:rPr lang="en-US" altLang="ko-KR" sz="1400" smtClean="0">
+                  <a:latin typeface="LG스마트체 Bold" panose="020B0600000101010101" pitchFamily="50" charset="-127"/>
+                  <a:ea typeface="LG스마트체 Bold" panose="020B0600000101010101" pitchFamily="50" charset="-127"/>
+                </a:rPr>
+                <a:t>Task 2</a:t>
+              </a:r>
+              <a:endParaRPr lang="ko-KR" altLang="en-US" sz="1400">
+                <a:latin typeface="LG스마트체 Bold" panose="020B0600000101010101" pitchFamily="50" charset="-127"/>
+                <a:ea typeface="LG스마트체 Bold" panose="020B0600000101010101" pitchFamily="50" charset="-127"/>
+              </a:endParaRPr>
+            </a:p>
+          </p:txBody>
+        </p:sp>
+      </p:grpSp>
     </p:spTree>
     <p:extLst>
       <p:ext uri="{BB962C8B-B14F-4D97-AF65-F5344CB8AC3E}">
@@ -8649,7 +9381,7 @@
         <p:spPr>
           <a:xfrm>
             <a:off x="737675" y="1800664"/>
-            <a:ext cx="1470274" cy="769441"/>
+            <a:ext cx="12329016" cy="3847207"/>
           </a:xfrm>
           <a:prstGeom prst="rect">
             <a:avLst/>
@@ -8680,13 +9412,295 @@
               <a:buChar char="Ø"/>
             </a:pPr>
             <a:r>
-              <a:rPr lang="ko-KR" altLang="en-US" sz="2000" smtClean="0">
-                <a:latin typeface="LG스마트체2.0 Regular" panose="020B0600000101010101" pitchFamily="50" charset="-127"/>
-                <a:ea typeface="LG스마트체2.0 Regular" panose="020B0600000101010101" pitchFamily="50" charset="-127"/>
-              </a:rPr>
-              <a:t>기술</a:t>
-            </a:r>
-            <a:endParaRPr lang="en-US" altLang="ko-KR" sz="2400">
+              <a:rPr lang="en-US" altLang="ko-KR" sz="2000" smtClean="0">
+                <a:latin typeface="LG스마트체2.0 Regular" panose="020B0600000101010101" pitchFamily="50" charset="-127"/>
+                <a:ea typeface="LG스마트체2.0 Regular" panose="020B0600000101010101" pitchFamily="50" charset="-127"/>
+              </a:rPr>
+              <a:t>Waiting queue</a:t>
+            </a:r>
+            <a:r>
+              <a:rPr lang="ko-KR" altLang="en-US" sz="2000" smtClean="0">
+                <a:latin typeface="LG스마트체2.0 Regular" panose="020B0600000101010101" pitchFamily="50" charset="-127"/>
+                <a:ea typeface="LG스마트체2.0 Regular" panose="020B0600000101010101" pitchFamily="50" charset="-127"/>
+              </a:rPr>
+              <a:t>를 활용한 </a:t>
+            </a:r>
+            <a:r>
+              <a:rPr lang="en-US" altLang="ko-KR" sz="2000" smtClean="0">
+                <a:latin typeface="LG스마트체2.0 Regular" panose="020B0600000101010101" pitchFamily="50" charset="-127"/>
+                <a:ea typeface="LG스마트체2.0 Regular" panose="020B0600000101010101" pitchFamily="50" charset="-127"/>
+              </a:rPr>
+              <a:t>mutex </a:t>
+            </a:r>
+            <a:r>
+              <a:rPr lang="ko-KR" altLang="en-US" sz="2000" smtClean="0">
+                <a:latin typeface="LG스마트체2.0 Regular" panose="020B0600000101010101" pitchFamily="50" charset="-127"/>
+                <a:ea typeface="LG스마트체2.0 Regular" panose="020B0600000101010101" pitchFamily="50" charset="-127"/>
+              </a:rPr>
+              <a:t>구현</a:t>
+            </a:r>
+            <a:endParaRPr lang="en-US" altLang="ko-KR" sz="2000" smtClean="0">
+              <a:latin typeface="LG스마트체2.0 Regular" panose="020B0600000101010101" pitchFamily="50" charset="-127"/>
+              <a:ea typeface="LG스마트체2.0 Regular" panose="020B0600000101010101" pitchFamily="50" charset="-127"/>
+            </a:endParaRPr>
+          </a:p>
+          <a:p>
+            <a:pPr marL="1257300" lvl="2" indent="-342900">
+              <a:buFont typeface="Wingdings" panose="05000000000000000000" pitchFamily="2" charset="2"/>
+              <a:buChar char="ü"/>
+            </a:pPr>
+            <a:r>
+              <a:rPr lang="en-US" altLang="ko-KR" sz="2000" smtClean="0">
+                <a:latin typeface="LG스마트체2.0 Regular" panose="020B0600000101010101" pitchFamily="50" charset="-127"/>
+                <a:ea typeface="LG스마트체2.0 Regular" panose="020B0600000101010101" pitchFamily="50" charset="-127"/>
+              </a:rPr>
+              <a:t>Mutex</a:t>
+            </a:r>
+            <a:r>
+              <a:rPr lang="ko-KR" altLang="en-US" sz="2000" smtClean="0">
+                <a:latin typeface="LG스마트체2.0 Regular" panose="020B0600000101010101" pitchFamily="50" charset="-127"/>
+                <a:ea typeface="LG스마트체2.0 Regular" panose="020B0600000101010101" pitchFamily="50" charset="-127"/>
+              </a:rPr>
+              <a:t>를 선점하면 </a:t>
+            </a:r>
+            <a:r>
+              <a:rPr lang="en-US" altLang="ko-KR" sz="2000" smtClean="0">
+                <a:latin typeface="LG스마트체2.0 Regular" panose="020B0600000101010101" pitchFamily="50" charset="-127"/>
+                <a:ea typeface="LG스마트체2.0 Regular" panose="020B0600000101010101" pitchFamily="50" charset="-127"/>
+              </a:rPr>
+              <a:t>waiting queue</a:t>
+            </a:r>
+            <a:r>
+              <a:rPr lang="ko-KR" altLang="en-US" sz="2000" smtClean="0">
+                <a:latin typeface="LG스마트체2.0 Regular" panose="020B0600000101010101" pitchFamily="50" charset="-127"/>
+                <a:ea typeface="LG스마트체2.0 Regular" panose="020B0600000101010101" pitchFamily="50" charset="-127"/>
+              </a:rPr>
+              <a:t>에 등록하고 해당 </a:t>
+            </a:r>
+            <a:r>
+              <a:rPr lang="en-US" altLang="ko-KR" sz="2000" smtClean="0">
+                <a:latin typeface="LG스마트체2.0 Regular" panose="020B0600000101010101" pitchFamily="50" charset="-127"/>
+                <a:ea typeface="LG스마트체2.0 Regular" panose="020B0600000101010101" pitchFamily="50" charset="-127"/>
+              </a:rPr>
+              <a:t>mutex</a:t>
+            </a:r>
+            <a:r>
+              <a:rPr lang="ko-KR" altLang="en-US" sz="2000" smtClean="0">
+                <a:latin typeface="LG스마트체2.0 Regular" panose="020B0600000101010101" pitchFamily="50" charset="-127"/>
+                <a:ea typeface="LG스마트체2.0 Regular" panose="020B0600000101010101" pitchFamily="50" charset="-127"/>
+              </a:rPr>
+              <a:t>를 </a:t>
+            </a:r>
+            <a:r>
+              <a:rPr lang="en-US" altLang="ko-KR" sz="2000" smtClean="0">
+                <a:latin typeface="LG스마트체2.0 Regular" panose="020B0600000101010101" pitchFamily="50" charset="-127"/>
+                <a:ea typeface="LG스마트체2.0 Regular" panose="020B0600000101010101" pitchFamily="50" charset="-127"/>
+              </a:rPr>
+              <a:t>Lock</a:t>
+            </a:r>
+          </a:p>
+          <a:p>
+            <a:pPr marL="1257300" lvl="2" indent="-342900">
+              <a:buFont typeface="Wingdings" panose="05000000000000000000" pitchFamily="2" charset="2"/>
+              <a:buChar char="ü"/>
+            </a:pPr>
+            <a:endParaRPr lang="en-US" altLang="ko-KR" sz="2000">
+              <a:latin typeface="LG스마트체2.0 Regular" panose="020B0600000101010101" pitchFamily="50" charset="-127"/>
+              <a:ea typeface="LG스마트체2.0 Regular" panose="020B0600000101010101" pitchFamily="50" charset="-127"/>
+            </a:endParaRPr>
+          </a:p>
+          <a:p>
+            <a:pPr marL="1257300" lvl="2" indent="-342900">
+              <a:buFont typeface="Wingdings" panose="05000000000000000000" pitchFamily="2" charset="2"/>
+              <a:buChar char="ü"/>
+            </a:pPr>
+            <a:endParaRPr lang="en-US" altLang="ko-KR" sz="2000" smtClean="0">
+              <a:latin typeface="LG스마트체2.0 Regular" panose="020B0600000101010101" pitchFamily="50" charset="-127"/>
+              <a:ea typeface="LG스마트체2.0 Regular" panose="020B0600000101010101" pitchFamily="50" charset="-127"/>
+            </a:endParaRPr>
+          </a:p>
+          <a:p>
+            <a:pPr lvl="2"/>
+            <a:endParaRPr lang="en-US" altLang="ko-KR" sz="2000" smtClean="0">
+              <a:latin typeface="LG스마트체2.0 Regular" panose="020B0600000101010101" pitchFamily="50" charset="-127"/>
+              <a:ea typeface="LG스마트체2.0 Regular" panose="020B0600000101010101" pitchFamily="50" charset="-127"/>
+            </a:endParaRPr>
+          </a:p>
+          <a:p>
+            <a:pPr lvl="2"/>
+            <a:endParaRPr lang="en-US" altLang="ko-KR" sz="2000" smtClean="0">
+              <a:latin typeface="LG스마트체2.0 Regular" panose="020B0600000101010101" pitchFamily="50" charset="-127"/>
+              <a:ea typeface="LG스마트체2.0 Regular" panose="020B0600000101010101" pitchFamily="50" charset="-127"/>
+            </a:endParaRPr>
+          </a:p>
+          <a:p>
+            <a:pPr marL="1257300" lvl="2" indent="-342900">
+              <a:buFont typeface="Wingdings" panose="05000000000000000000" pitchFamily="2" charset="2"/>
+              <a:buChar char="ü"/>
+            </a:pPr>
+            <a:r>
+              <a:rPr lang="ko-KR" altLang="en-US" sz="2000" smtClean="0">
+                <a:latin typeface="LG스마트체2.0 Regular" panose="020B0600000101010101" pitchFamily="50" charset="-127"/>
+                <a:ea typeface="LG스마트체2.0 Regular" panose="020B0600000101010101" pitchFamily="50" charset="-127"/>
+              </a:rPr>
+              <a:t>공유 자원 접근을 완료하면 </a:t>
+            </a:r>
+            <a:r>
+              <a:rPr lang="en-US" altLang="ko-KR" sz="2000" smtClean="0">
+                <a:latin typeface="LG스마트체2.0 Regular" panose="020B0600000101010101" pitchFamily="50" charset="-127"/>
+                <a:ea typeface="LG스마트체2.0 Regular" panose="020B0600000101010101" pitchFamily="50" charset="-127"/>
+              </a:rPr>
+              <a:t>waiting queue</a:t>
+            </a:r>
+            <a:r>
+              <a:rPr lang="ko-KR" altLang="en-US" sz="2000" smtClean="0">
+                <a:latin typeface="LG스마트체2.0 Regular" panose="020B0600000101010101" pitchFamily="50" charset="-127"/>
+                <a:ea typeface="LG스마트체2.0 Regular" panose="020B0600000101010101" pitchFamily="50" charset="-127"/>
+              </a:rPr>
+              <a:t>에서 </a:t>
+            </a:r>
+            <a:r>
+              <a:rPr lang="en-US" altLang="ko-KR" sz="2000" smtClean="0">
+                <a:latin typeface="LG스마트체2.0 Regular" panose="020B0600000101010101" pitchFamily="50" charset="-127"/>
+                <a:ea typeface="LG스마트체2.0 Regular" panose="020B0600000101010101" pitchFamily="50" charset="-127"/>
+              </a:rPr>
+              <a:t>dequeue </a:t>
+            </a:r>
+            <a:r>
+              <a:rPr lang="ko-KR" altLang="en-US" sz="2000" smtClean="0">
+                <a:latin typeface="LG스마트체2.0 Regular" panose="020B0600000101010101" pitchFamily="50" charset="-127"/>
+                <a:ea typeface="LG스마트체2.0 Regular" panose="020B0600000101010101" pitchFamily="50" charset="-127"/>
+              </a:rPr>
+              <a:t>진행하고 해당 </a:t>
+            </a:r>
+            <a:r>
+              <a:rPr lang="en-US" altLang="ko-KR" sz="2000" smtClean="0">
+                <a:latin typeface="LG스마트체2.0 Regular" panose="020B0600000101010101" pitchFamily="50" charset="-127"/>
+                <a:ea typeface="LG스마트체2.0 Regular" panose="020B0600000101010101" pitchFamily="50" charset="-127"/>
+              </a:rPr>
+              <a:t>mutex</a:t>
+            </a:r>
+            <a:r>
+              <a:rPr lang="ko-KR" altLang="en-US" sz="2000" smtClean="0">
+                <a:latin typeface="LG스마트체2.0 Regular" panose="020B0600000101010101" pitchFamily="50" charset="-127"/>
+                <a:ea typeface="LG스마트체2.0 Regular" panose="020B0600000101010101" pitchFamily="50" charset="-127"/>
+              </a:rPr>
+              <a:t>를 </a:t>
+            </a:r>
+            <a:r>
+              <a:rPr lang="en-US" altLang="ko-KR" sz="2000" smtClean="0">
+                <a:latin typeface="LG스마트체2.0 Regular" panose="020B0600000101010101" pitchFamily="50" charset="-127"/>
+                <a:ea typeface="LG스마트체2.0 Regular" panose="020B0600000101010101" pitchFamily="50" charset="-127"/>
+              </a:rPr>
+              <a:t>unlock</a:t>
+            </a:r>
+          </a:p>
+          <a:p>
+            <a:pPr marL="1257300" lvl="2" indent="-342900">
+              <a:buFont typeface="Wingdings" panose="05000000000000000000" pitchFamily="2" charset="2"/>
+              <a:buChar char="ü"/>
+            </a:pPr>
+            <a:endParaRPr lang="en-US" altLang="ko-KR" sz="2000">
+              <a:latin typeface="LG스마트체2.0 Regular" panose="020B0600000101010101" pitchFamily="50" charset="-127"/>
+              <a:ea typeface="LG스마트체2.0 Regular" panose="020B0600000101010101" pitchFamily="50" charset="-127"/>
+            </a:endParaRPr>
+          </a:p>
+          <a:p>
+            <a:pPr marL="1257300" lvl="2" indent="-342900">
+              <a:buFont typeface="Wingdings" panose="05000000000000000000" pitchFamily="2" charset="2"/>
+              <a:buChar char="ü"/>
+            </a:pPr>
+            <a:endParaRPr lang="en-US" altLang="ko-KR" sz="2000" smtClean="0">
+              <a:latin typeface="LG스마트체2.0 Regular" panose="020B0600000101010101" pitchFamily="50" charset="-127"/>
+              <a:ea typeface="LG스마트체2.0 Regular" panose="020B0600000101010101" pitchFamily="50" charset="-127"/>
+            </a:endParaRPr>
+          </a:p>
+          <a:p>
+            <a:pPr marL="1257300" lvl="2" indent="-342900">
+              <a:buFont typeface="Wingdings" panose="05000000000000000000" pitchFamily="2" charset="2"/>
+              <a:buChar char="ü"/>
+            </a:pPr>
+            <a:endParaRPr lang="en-US" altLang="ko-KR" sz="2000">
+              <a:latin typeface="LG스마트체2.0 Regular" panose="020B0600000101010101" pitchFamily="50" charset="-127"/>
+              <a:ea typeface="LG스마트체2.0 Regular" panose="020B0600000101010101" pitchFamily="50" charset="-127"/>
+            </a:endParaRPr>
+          </a:p>
+          <a:p>
+            <a:pPr marL="1257300" lvl="2" indent="-342900">
+              <a:buFont typeface="Wingdings" panose="05000000000000000000" pitchFamily="2" charset="2"/>
+              <a:buChar char="ü"/>
+            </a:pPr>
+            <a:r>
+              <a:rPr lang="ko-KR" altLang="en-US" sz="2000" smtClean="0">
+                <a:latin typeface="LG스마트체2.0 Regular" panose="020B0600000101010101" pitchFamily="50" charset="-127"/>
+                <a:ea typeface="LG스마트체2.0 Regular" panose="020B0600000101010101" pitchFamily="50" charset="-127"/>
+              </a:rPr>
+              <a:t>공유 자원을 사용하는 곳의 앞</a:t>
+            </a:r>
+            <a:r>
+              <a:rPr lang="en-US" altLang="ko-KR" sz="2000" smtClean="0">
+                <a:latin typeface="LG스마트체2.0 Regular" panose="020B0600000101010101" pitchFamily="50" charset="-127"/>
+                <a:ea typeface="LG스마트체2.0 Regular" panose="020B0600000101010101" pitchFamily="50" charset="-127"/>
+              </a:rPr>
+              <a:t>, </a:t>
+            </a:r>
+            <a:r>
+              <a:rPr lang="ko-KR" altLang="en-US" sz="2000" smtClean="0">
+                <a:latin typeface="LG스마트체2.0 Regular" panose="020B0600000101010101" pitchFamily="50" charset="-127"/>
+                <a:ea typeface="LG스마트체2.0 Regular" panose="020B0600000101010101" pitchFamily="50" charset="-127"/>
+              </a:rPr>
+              <a:t>뒤에 </a:t>
+            </a:r>
+            <a:r>
+              <a:rPr lang="en-US" altLang="ko-KR" sz="2000" smtClean="0">
+                <a:latin typeface="LG스마트체2.0 Regular" panose="020B0600000101010101" pitchFamily="50" charset="-127"/>
+                <a:ea typeface="LG스마트체2.0 Regular" panose="020B0600000101010101" pitchFamily="50" charset="-127"/>
+              </a:rPr>
+              <a:t>Mutex</a:t>
+            </a:r>
+            <a:r>
+              <a:rPr lang="ko-KR" altLang="en-US" sz="2000" smtClean="0">
+                <a:latin typeface="LG스마트체2.0 Regular" panose="020B0600000101010101" pitchFamily="50" charset="-127"/>
+                <a:ea typeface="LG스마트체2.0 Regular" panose="020B0600000101010101" pitchFamily="50" charset="-127"/>
+              </a:rPr>
+              <a:t>를 적용하고</a:t>
+            </a:r>
+            <a:r>
+              <a:rPr lang="en-US" altLang="ko-KR" sz="2000" smtClean="0">
+                <a:latin typeface="LG스마트체2.0 Regular" panose="020B0600000101010101" pitchFamily="50" charset="-127"/>
+                <a:ea typeface="LG스마트체2.0 Regular" panose="020B0600000101010101" pitchFamily="50" charset="-127"/>
+              </a:rPr>
+              <a:t>,</a:t>
+            </a:r>
+            <a:r>
+              <a:rPr lang="ko-KR" altLang="en-US" sz="2000" smtClean="0">
+                <a:latin typeface="LG스마트체2.0 Regular" panose="020B0600000101010101" pitchFamily="50" charset="-127"/>
+                <a:ea typeface="LG스마트체2.0 Regular" panose="020B0600000101010101" pitchFamily="50" charset="-127"/>
+              </a:rPr>
+              <a:t> </a:t>
+            </a:r>
+            <a:r>
+              <a:rPr lang="en-US" altLang="ko-KR" sz="2000" smtClean="0">
+                <a:latin typeface="LG스마트체2.0 Regular" panose="020B0600000101010101" pitchFamily="50" charset="-127"/>
+                <a:ea typeface="LG스마트체2.0 Regular" panose="020B0600000101010101" pitchFamily="50" charset="-127"/>
+              </a:rPr>
+              <a:t>Uart printf</a:t>
+            </a:r>
+            <a:r>
+              <a:rPr lang="ko-KR" altLang="en-US" sz="2000" smtClean="0">
+                <a:latin typeface="LG스마트체2.0 Regular" panose="020B0600000101010101" pitchFamily="50" charset="-127"/>
+                <a:ea typeface="LG스마트체2.0 Regular" panose="020B0600000101010101" pitchFamily="50" charset="-127"/>
+              </a:rPr>
+              <a:t>에 적용했을 때 정상 동작함을 확</a:t>
+            </a:r>
+            <a:r>
+              <a:rPr lang="ko-KR" altLang="en-US" sz="2000" smtClean="0">
+                <a:latin typeface="LG스마트체2.0 Regular" panose="020B0600000101010101" pitchFamily="50" charset="-127"/>
+                <a:ea typeface="LG스마트체2.0 Regular" panose="020B0600000101010101" pitchFamily="50" charset="-127"/>
+              </a:rPr>
+              <a:t>인</a:t>
+            </a:r>
+            <a:endParaRPr lang="en-US" altLang="ko-KR" sz="2000">
               <a:latin typeface="LG스마트체2.0 Regular" panose="020B0600000101010101" pitchFamily="50" charset="-127"/>
               <a:ea typeface="LG스마트체2.0 Regular" panose="020B0600000101010101" pitchFamily="50" charset="-127"/>
             </a:endParaRPr>
@@ -8729,60 +9743,352 @@
           </a:p>
         </p:txBody>
       </p:sp>
+      <p:pic>
+        <p:nvPicPr>
+          <p:cNvPr id="5" name="그림 4"/>
+          <p:cNvPicPr>
+            <a:picLocks noChangeAspect="1"/>
+          </p:cNvPicPr>
+          <p:nvPr/>
+        </p:nvPicPr>
+        <p:blipFill>
+          <a:blip r:embed="rId2"/>
+          <a:stretch>
+            <a:fillRect/>
+          </a:stretch>
+        </p:blipFill>
+        <p:spPr>
+          <a:xfrm>
+            <a:off x="4233945" y="7656199"/>
+            <a:ext cx="8878539" cy="1819529"/>
+          </a:xfrm>
+          <a:prstGeom prst="rect">
+            <a:avLst/>
+          </a:prstGeom>
+        </p:spPr>
+      </p:pic>
       <p:grpSp>
         <p:nvGrpSpPr>
-          <p:cNvPr id="33" name="그룹 32"/>
+          <p:cNvPr id="13" name="그룹 12"/>
           <p:cNvGrpSpPr/>
           <p:nvPr/>
         </p:nvGrpSpPr>
         <p:grpSpPr>
           <a:xfrm>
-            <a:off x="2516643" y="3811811"/>
-            <a:ext cx="8985287" cy="1034812"/>
-            <a:chOff x="-7139283" y="5408745"/>
-            <a:chExt cx="8985287" cy="1034812"/>
+            <a:off x="2205434" y="2928702"/>
+            <a:ext cx="7826350" cy="541350"/>
+            <a:chOff x="5939234" y="3199377"/>
+            <a:chExt cx="7826350" cy="541350"/>
+          </a:xfrm>
+        </p:grpSpPr>
+        <p:grpSp>
+          <p:nvGrpSpPr>
+            <p:cNvPr id="12" name="그룹 11"/>
+            <p:cNvGrpSpPr/>
+            <p:nvPr/>
+          </p:nvGrpSpPr>
+          <p:grpSpPr>
+            <a:xfrm>
+              <a:off x="5939234" y="3199377"/>
+              <a:ext cx="7826350" cy="527496"/>
+              <a:chOff x="5939234" y="3199377"/>
+              <a:chExt cx="7173249" cy="483477"/>
+            </a:xfrm>
+          </p:grpSpPr>
+          <p:pic>
+            <p:nvPicPr>
+              <p:cNvPr id="11" name="그림 10"/>
+              <p:cNvPicPr>
+                <a:picLocks noChangeAspect="1"/>
+              </p:cNvPicPr>
+              <p:nvPr/>
+            </p:nvPicPr>
+            <p:blipFill rotWithShape="1">
+              <a:blip r:embed="rId3"/>
+              <a:srcRect b="96891"/>
+              <a:stretch/>
+            </p:blipFill>
+            <p:spPr>
+              <a:xfrm>
+                <a:off x="5939234" y="3199377"/>
+                <a:ext cx="7173249" cy="177734"/>
+              </a:xfrm>
+              <a:prstGeom prst="rect">
+                <a:avLst/>
+              </a:prstGeom>
+            </p:spPr>
+          </p:pic>
+          <p:pic>
+            <p:nvPicPr>
+              <p:cNvPr id="22" name="그림 21"/>
+              <p:cNvPicPr>
+                <a:picLocks noChangeAspect="1"/>
+              </p:cNvPicPr>
+              <p:nvPr/>
+            </p:nvPicPr>
+            <p:blipFill rotWithShape="1">
+              <a:blip r:embed="rId3"/>
+              <a:srcRect t="25151" b="72410"/>
+              <a:stretch/>
+            </p:blipFill>
+            <p:spPr>
+              <a:xfrm>
+                <a:off x="5939234" y="3377111"/>
+                <a:ext cx="7173249" cy="139444"/>
+              </a:xfrm>
+              <a:prstGeom prst="rect">
+                <a:avLst/>
+              </a:prstGeom>
+            </p:spPr>
+          </p:pic>
+          <p:pic>
+            <p:nvPicPr>
+              <p:cNvPr id="23" name="그림 22"/>
+              <p:cNvPicPr>
+                <a:picLocks noChangeAspect="1"/>
+              </p:cNvPicPr>
+              <p:nvPr/>
+            </p:nvPicPr>
+            <p:blipFill rotWithShape="1">
+              <a:blip r:embed="rId3"/>
+              <a:srcRect t="97091"/>
+              <a:stretch/>
+            </p:blipFill>
+            <p:spPr>
+              <a:xfrm>
+                <a:off x="5939234" y="3516554"/>
+                <a:ext cx="7173249" cy="166300"/>
+              </a:xfrm>
+              <a:prstGeom prst="rect">
+                <a:avLst/>
+              </a:prstGeom>
+            </p:spPr>
+          </p:pic>
+        </p:grpSp>
+        <p:sp>
+          <p:nvSpPr>
+            <p:cNvPr id="24" name="직사각형 23"/>
+            <p:cNvSpPr/>
+            <p:nvPr/>
+          </p:nvSpPr>
+          <p:spPr>
+            <a:xfrm>
+              <a:off x="6753801" y="3392941"/>
+              <a:ext cx="6352599" cy="347786"/>
+            </a:xfrm>
+            <a:prstGeom prst="rect">
+              <a:avLst/>
+            </a:prstGeom>
+            <a:noFill/>
+            <a:ln w="28575">
+              <a:solidFill>
+                <a:srgbClr val="FF0000"/>
+              </a:solidFill>
+            </a:ln>
+          </p:spPr>
+          <p:style>
+            <a:lnRef idx="2">
+              <a:schemeClr val="accent1">
+                <a:shade val="50000"/>
+              </a:schemeClr>
+            </a:lnRef>
+            <a:fillRef idx="1">
+              <a:schemeClr val="accent1"/>
+            </a:fillRef>
+            <a:effectRef idx="0">
+              <a:schemeClr val="accent1"/>
+            </a:effectRef>
+            <a:fontRef idx="minor">
+              <a:schemeClr val="lt1"/>
+            </a:fontRef>
+          </p:style>
+          <p:txBody>
+            <a:bodyPr rtlCol="0" anchor="ctr"/>
+            <a:lstStyle/>
+            <a:p>
+              <a:pPr algn="ctr"/>
+              <a:endParaRPr lang="ko-KR" altLang="en-US"/>
+            </a:p>
+          </p:txBody>
+        </p:sp>
+      </p:grpSp>
+      <p:grpSp>
+        <p:nvGrpSpPr>
+          <p:cNvPr id="16" name="그룹 15"/>
+          <p:cNvGrpSpPr/>
+          <p:nvPr/>
+        </p:nvGrpSpPr>
+        <p:grpSpPr>
+          <a:xfrm>
+            <a:off x="2205434" y="4416765"/>
+            <a:ext cx="7826350" cy="534981"/>
+            <a:chOff x="7340195" y="5428832"/>
+            <a:chExt cx="6973273" cy="476668"/>
+          </a:xfrm>
+        </p:grpSpPr>
+        <p:grpSp>
+          <p:nvGrpSpPr>
+            <p:cNvPr id="15" name="그룹 14"/>
+            <p:cNvGrpSpPr/>
+            <p:nvPr/>
+          </p:nvGrpSpPr>
+          <p:grpSpPr>
+            <a:xfrm>
+              <a:off x="7340195" y="5428832"/>
+              <a:ext cx="6973273" cy="452883"/>
+              <a:chOff x="7340195" y="5428832"/>
+              <a:chExt cx="6973273" cy="452883"/>
+            </a:xfrm>
+          </p:grpSpPr>
+          <p:pic>
+            <p:nvPicPr>
+              <p:cNvPr id="14" name="그림 13"/>
+              <p:cNvPicPr>
+                <a:picLocks noChangeAspect="1"/>
+              </p:cNvPicPr>
+              <p:nvPr/>
+            </p:nvPicPr>
+            <p:blipFill rotWithShape="1">
+              <a:blip r:embed="rId4"/>
+              <a:srcRect b="94727"/>
+              <a:stretch/>
+            </p:blipFill>
+            <p:spPr>
+              <a:xfrm>
+                <a:off x="7340195" y="5428832"/>
+                <a:ext cx="6973273" cy="170277"/>
+              </a:xfrm>
+              <a:prstGeom prst="rect">
+                <a:avLst/>
+              </a:prstGeom>
+            </p:spPr>
+          </p:pic>
+          <p:pic>
+            <p:nvPicPr>
+              <p:cNvPr id="26" name="그림 25"/>
+              <p:cNvPicPr>
+                <a:picLocks noChangeAspect="1"/>
+              </p:cNvPicPr>
+              <p:nvPr/>
+            </p:nvPicPr>
+            <p:blipFill rotWithShape="1">
+              <a:blip r:embed="rId4"/>
+              <a:srcRect t="76254" b="18996"/>
+              <a:stretch/>
+            </p:blipFill>
+            <p:spPr>
+              <a:xfrm>
+                <a:off x="7340195" y="5599109"/>
+                <a:ext cx="6973273" cy="153406"/>
+              </a:xfrm>
+              <a:prstGeom prst="rect">
+                <a:avLst/>
+              </a:prstGeom>
+            </p:spPr>
+          </p:pic>
+          <p:pic>
+            <p:nvPicPr>
+              <p:cNvPr id="27" name="그림 26"/>
+              <p:cNvPicPr>
+                <a:picLocks noChangeAspect="1"/>
+              </p:cNvPicPr>
+              <p:nvPr/>
+            </p:nvPicPr>
+            <p:blipFill rotWithShape="1">
+              <a:blip r:embed="rId4"/>
+              <a:srcRect t="95975"/>
+              <a:stretch/>
+            </p:blipFill>
+            <p:spPr>
+              <a:xfrm>
+                <a:off x="7340195" y="5751724"/>
+                <a:ext cx="6973273" cy="129991"/>
+              </a:xfrm>
+              <a:prstGeom prst="rect">
+                <a:avLst/>
+              </a:prstGeom>
+            </p:spPr>
+          </p:pic>
+        </p:grpSp>
+        <p:sp>
+          <p:nvSpPr>
+            <p:cNvPr id="30" name="직사각형 29"/>
+            <p:cNvSpPr/>
+            <p:nvPr/>
+          </p:nvSpPr>
+          <p:spPr>
+            <a:xfrm>
+              <a:off x="8229426" y="5586584"/>
+              <a:ext cx="6058074" cy="318916"/>
+            </a:xfrm>
+            <a:prstGeom prst="rect">
+              <a:avLst/>
+            </a:prstGeom>
+            <a:noFill/>
+            <a:ln w="28575">
+              <a:solidFill>
+                <a:srgbClr val="FF0000"/>
+              </a:solidFill>
+            </a:ln>
+          </p:spPr>
+          <p:style>
+            <a:lnRef idx="2">
+              <a:schemeClr val="accent1">
+                <a:shade val="50000"/>
+              </a:schemeClr>
+            </a:lnRef>
+            <a:fillRef idx="1">
+              <a:schemeClr val="accent1"/>
+            </a:fillRef>
+            <a:effectRef idx="0">
+              <a:schemeClr val="accent1"/>
+            </a:effectRef>
+            <a:fontRef idx="minor">
+              <a:schemeClr val="lt1"/>
+            </a:fontRef>
+          </p:style>
+          <p:txBody>
+            <a:bodyPr rtlCol="0" anchor="ctr"/>
+            <a:lstStyle/>
+            <a:p>
+              <a:pPr algn="ctr"/>
+              <a:endParaRPr lang="ko-KR" altLang="en-US"/>
+            </a:p>
+          </p:txBody>
+        </p:sp>
+      </p:grpSp>
+      <p:grpSp>
+        <p:nvGrpSpPr>
+          <p:cNvPr id="18" name="그룹 17"/>
+          <p:cNvGrpSpPr/>
+          <p:nvPr/>
+        </p:nvGrpSpPr>
+        <p:grpSpPr>
+          <a:xfrm>
+            <a:off x="12434472" y="2928702"/>
+            <a:ext cx="3539073" cy="1920288"/>
+            <a:chOff x="10430927" y="2928702"/>
+            <a:chExt cx="3539073" cy="1920288"/>
           </a:xfrm>
         </p:grpSpPr>
         <p:pic>
           <p:nvPicPr>
-            <p:cNvPr id="29" name="그림 28"/>
+            <p:cNvPr id="6" name="그림 5"/>
             <p:cNvPicPr>
               <a:picLocks noChangeAspect="1"/>
             </p:cNvPicPr>
             <p:nvPr/>
           </p:nvPicPr>
-          <p:blipFill rotWithShape="1">
-            <a:blip r:embed="rId2"/>
-            <a:srcRect b="93582"/>
-            <a:stretch/>
+          <p:blipFill>
+            <a:blip r:embed="rId5"/>
+            <a:stretch>
+              <a:fillRect/>
+            </a:stretch>
           </p:blipFill>
           <p:spPr>
             <a:xfrm>
-              <a:off x="-7139283" y="5408745"/>
-              <a:ext cx="8985287" cy="286483"/>
-            </a:xfrm>
-            <a:prstGeom prst="rect">
-              <a:avLst/>
-            </a:prstGeom>
-          </p:spPr>
-        </p:pic>
-        <p:pic>
-          <p:nvPicPr>
-            <p:cNvPr id="31" name="그림 30"/>
-            <p:cNvPicPr>
-              <a:picLocks noChangeAspect="1"/>
-            </p:cNvPicPr>
-            <p:nvPr/>
-          </p:nvPicPr>
-          <p:blipFill rotWithShape="1">
-            <a:blip r:embed="rId2"/>
-            <a:srcRect t="83849"/>
-            <a:stretch/>
-          </p:blipFill>
-          <p:spPr>
-            <a:xfrm>
-              <a:off x="-7139283" y="5695228"/>
-              <a:ext cx="8985287" cy="721003"/>
+              <a:off x="10430927" y="2928702"/>
+              <a:ext cx="3526684" cy="1920288"/>
             </a:xfrm>
             <a:prstGeom prst="rect">
               <a:avLst/>
@@ -8791,14 +10097,99 @@
         </p:pic>
         <p:sp>
           <p:nvSpPr>
-            <p:cNvPr id="32" name="직사각형 31"/>
+            <p:cNvPr id="34" name="직사각형 33"/>
             <p:cNvSpPr/>
             <p:nvPr/>
           </p:nvSpPr>
           <p:spPr>
             <a:xfrm>
-              <a:off x="-6407325" y="6197392"/>
-              <a:ext cx="3746913" cy="246165"/>
+              <a:off x="10970201" y="3909666"/>
+              <a:ext cx="2999799" cy="636934"/>
+            </a:xfrm>
+            <a:prstGeom prst="rect">
+              <a:avLst/>
+            </a:prstGeom>
+            <a:noFill/>
+            <a:ln w="28575">
+              <a:solidFill>
+                <a:srgbClr val="FF0000"/>
+              </a:solidFill>
+            </a:ln>
+          </p:spPr>
+          <p:style>
+            <a:lnRef idx="2">
+              <a:schemeClr val="accent1">
+                <a:shade val="50000"/>
+              </a:schemeClr>
+            </a:lnRef>
+            <a:fillRef idx="1">
+              <a:schemeClr val="accent1"/>
+            </a:fillRef>
+            <a:effectRef idx="0">
+              <a:schemeClr val="accent1"/>
+            </a:effectRef>
+            <a:fontRef idx="minor">
+              <a:schemeClr val="lt1"/>
+            </a:fontRef>
+          </p:style>
+          <p:txBody>
+            <a:bodyPr rtlCol="0" anchor="ctr"/>
+            <a:lstStyle/>
+            <a:p>
+              <a:pPr algn="ctr"/>
+              <a:endParaRPr lang="ko-KR" altLang="en-US"/>
+            </a:p>
+          </p:txBody>
+        </p:sp>
+      </p:grpSp>
+      <p:grpSp>
+        <p:nvGrpSpPr>
+          <p:cNvPr id="28" name="그룹 27"/>
+          <p:cNvGrpSpPr/>
+          <p:nvPr/>
+        </p:nvGrpSpPr>
+        <p:grpSpPr>
+          <a:xfrm>
+            <a:off x="2205434" y="5633658"/>
+            <a:ext cx="3419952" cy="1781424"/>
+            <a:chOff x="12725553" y="5524386"/>
+            <a:chExt cx="3419952" cy="1781424"/>
+          </a:xfrm>
+        </p:grpSpPr>
+        <p:pic>
+          <p:nvPicPr>
+            <p:cNvPr id="25" name="그림 24"/>
+            <p:cNvPicPr>
+              <a:picLocks noChangeAspect="1"/>
+            </p:cNvPicPr>
+            <p:nvPr/>
+          </p:nvPicPr>
+          <p:blipFill>
+            <a:blip r:embed="rId6"/>
+            <a:stretch>
+              <a:fillRect/>
+            </a:stretch>
+          </p:blipFill>
+          <p:spPr>
+            <a:xfrm>
+              <a:off x="12725553" y="5524386"/>
+              <a:ext cx="3419952" cy="1781424"/>
+            </a:xfrm>
+            <a:prstGeom prst="rect">
+              <a:avLst/>
+            </a:prstGeom>
+          </p:spPr>
+        </p:pic>
+        <p:sp>
+          <p:nvSpPr>
+            <p:cNvPr id="36" name="직사각형 35"/>
+            <p:cNvSpPr/>
+            <p:nvPr/>
+          </p:nvSpPr>
+          <p:spPr>
+            <a:xfrm>
+              <a:off x="12941299" y="6329783"/>
+              <a:ext cx="3195439" cy="172617"/>
             </a:xfrm>
             <a:prstGeom prst="rect">
               <a:avLst/>
@@ -8837,14 +10228,14 @@
         </p:sp>
         <p:sp>
           <p:nvSpPr>
-            <p:cNvPr id="35" name="직사각형 34"/>
+            <p:cNvPr id="37" name="직사각형 36"/>
             <p:cNvSpPr/>
             <p:nvPr/>
           </p:nvSpPr>
           <p:spPr>
             <a:xfrm>
-              <a:off x="126703" y="5500707"/>
-              <a:ext cx="1276885" cy="246165"/>
+              <a:off x="12941299" y="7132921"/>
+              <a:ext cx="3195439" cy="172617"/>
             </a:xfrm>
             <a:prstGeom prst="rect">
               <a:avLst/>
@@ -8882,73 +10273,6 @@
           </p:txBody>
         </p:sp>
       </p:grpSp>
-      <p:pic>
-        <p:nvPicPr>
-          <p:cNvPr id="5" name="그림 4"/>
-          <p:cNvPicPr>
-            <a:picLocks noChangeAspect="1"/>
-          </p:cNvPicPr>
-          <p:nvPr/>
-        </p:nvPicPr>
-        <p:blipFill>
-          <a:blip r:embed="rId3"/>
-          <a:stretch>
-            <a:fillRect/>
-          </a:stretch>
-        </p:blipFill>
-        <p:spPr>
-          <a:xfrm>
-            <a:off x="4233945" y="7656199"/>
-            <a:ext cx="8878539" cy="1819529"/>
-          </a:xfrm>
-          <a:prstGeom prst="rect">
-            <a:avLst/>
-          </a:prstGeom>
-        </p:spPr>
-      </p:pic>
-      <p:sp>
-        <p:nvSpPr>
-          <p:cNvPr id="21" name="직사각형 20"/>
-          <p:cNvSpPr/>
-          <p:nvPr/>
-        </p:nvSpPr>
-        <p:spPr>
-          <a:xfrm>
-            <a:off x="2140206" y="2768813"/>
-            <a:ext cx="11690093" cy="4487276"/>
-          </a:xfrm>
-          <a:prstGeom prst="rect">
-            <a:avLst/>
-          </a:prstGeom>
-        </p:spPr>
-        <p:style>
-          <a:lnRef idx="2">
-            <a:schemeClr val="accent1">
-              <a:shade val="50000"/>
-            </a:schemeClr>
-          </a:lnRef>
-          <a:fillRef idx="1">
-            <a:schemeClr val="accent1"/>
-          </a:fillRef>
-          <a:effectRef idx="0">
-            <a:schemeClr val="accent1"/>
-          </a:effectRef>
-          <a:fontRef idx="minor">
-            <a:schemeClr val="lt1"/>
-          </a:fontRef>
-        </p:style>
-        <p:txBody>
-          <a:bodyPr rtlCol="0" anchor="ctr"/>
-          <a:lstStyle/>
-          <a:p>
-            <a:pPr algn="ctr"/>
-            <a:r>
-              <a:rPr lang="en-US" altLang="ko-KR" smtClean="0"/>
-              <a:t>TBD</a:t>
-            </a:r>
-          </a:p>
-        </p:txBody>
-      </p:sp>
     </p:spTree>
     <p:extLst>
       <p:ext uri="{BB962C8B-B14F-4D97-AF65-F5344CB8AC3E}">

</xml_diff>